<commit_message>
Final presentation and demo
</commit_message>
<xml_diff>
--- a/josh-corrick/UsingDbatoolsToAutomateDeployments.pptx
+++ b/josh-corrick/UsingDbatoolsToAutomateDeployments.pptx
@@ -5,7 +5,7 @@
     <p:sldMasterId id="2147483648" r:id="rId1"/>
   </p:sldMasterIdLst>
   <p:notesMasterIdLst>
-    <p:notesMasterId r:id="rId12"/>
+    <p:notesMasterId r:id="rId11"/>
   </p:notesMasterIdLst>
   <p:sldIdLst>
     <p:sldId id="275" r:id="rId2"/>
@@ -17,7 +17,6 @@
     <p:sldId id="278" r:id="rId8"/>
     <p:sldId id="284" r:id="rId9"/>
     <p:sldId id="282" r:id="rId10"/>
-    <p:sldId id="274" r:id="rId11"/>
   </p:sldIdLst>
   <p:sldSz cx="12192000" cy="6858000"/>
   <p:notesSz cx="6858000" cy="9144000"/>
@@ -217,7 +216,7 @@
           <a:p>
             <a:fld id="{7F89AD86-B2B5-448B-B855-EA789EC8799F}" type="datetimeFigureOut">
               <a:rPr lang="en-US" smtClean="0"/>
-              <a:t>9/18/2019</a:t>
+              <a:t>9/20/2019</a:t>
             </a:fld>
             <a:endParaRPr lang="en-US"/>
           </a:p>
@@ -617,7 +616,7 @@
           <a:p>
             <a:r>
               <a:rPr lang="en-US" dirty="0"/>
-              <a:t>SQLCMD tool originally designed for interacting with the database only. </a:t>
+              <a:t>SQLCMD tool originally designed for interacting with the database only, used OBDC driver. </a:t>
             </a:r>
             <a:r>
               <a:rPr lang="en-US" dirty="0" err="1"/>
@@ -625,7 +624,7 @@
             </a:r>
             <a:r>
               <a:rPr lang="en-US" dirty="0"/>
-              <a:t> was not a fan favorite as it was restrictive and buggy. </a:t>
+              <a:t> was not a fan favorite as it was restrictive and buggy (based on PowerShell2.0). </a:t>
             </a:r>
             <a:r>
               <a:rPr lang="en-US" dirty="0" err="1"/>
@@ -649,7 +648,7 @@
             </a:r>
             <a:r>
               <a:rPr lang="en-US" dirty="0"/>
-              <a:t> was slow,</a:t>
+              <a:t> was slow, and buggy. (Although it has gotten better last release 13 hours ago, but 2 months before).</a:t>
             </a:r>
           </a:p>
         </p:txBody>
@@ -1187,7 +1186,7 @@
           <a:p>
             <a:fld id="{A8B89F18-586E-4B97-8EEA-25E99A190A89}" type="datetimeFigureOut">
               <a:rPr lang="en-US" smtClean="0"/>
-              <a:t>9/18/2019</a:t>
+              <a:t>9/20/2019</a:t>
             </a:fld>
             <a:endParaRPr lang="en-US"/>
           </a:p>
@@ -1546,7 +1545,7 @@
           <a:p>
             <a:fld id="{A8B89F18-586E-4B97-8EEA-25E99A190A89}" type="datetimeFigureOut">
               <a:rPr lang="en-US" smtClean="0"/>
-              <a:t>9/18/2019</a:t>
+              <a:t>9/20/2019</a:t>
             </a:fld>
             <a:endParaRPr lang="en-US"/>
           </a:p>
@@ -1948,7 +1947,7 @@
           <a:p>
             <a:fld id="{A8B89F18-586E-4B97-8EEA-25E99A190A89}" type="datetimeFigureOut">
               <a:rPr lang="en-US" smtClean="0"/>
-              <a:t>9/18/2019</a:t>
+              <a:t>9/20/2019</a:t>
             </a:fld>
             <a:endParaRPr lang="en-US"/>
           </a:p>
@@ -2340,7 +2339,7 @@
           <a:p>
             <a:fld id="{A8B89F18-586E-4B97-8EEA-25E99A190A89}" type="datetimeFigureOut">
               <a:rPr lang="en-US" smtClean="0"/>
-              <a:t>9/18/2019</a:t>
+              <a:t>9/20/2019</a:t>
             </a:fld>
             <a:endParaRPr lang="en-US"/>
           </a:p>
@@ -2814,7 +2813,7 @@
           <a:p>
             <a:fld id="{A8B89F18-586E-4B97-8EEA-25E99A190A89}" type="datetimeFigureOut">
               <a:rPr lang="en-US" smtClean="0"/>
-              <a:t>9/18/2019</a:t>
+              <a:t>9/20/2019</a:t>
             </a:fld>
             <a:endParaRPr lang="en-US"/>
           </a:p>
@@ -3283,7 +3282,7 @@
           <a:p>
             <a:fld id="{A8B89F18-586E-4B97-8EEA-25E99A190A89}" type="datetimeFigureOut">
               <a:rPr lang="en-US" smtClean="0"/>
-              <a:t>9/18/2019</a:t>
+              <a:t>9/20/2019</a:t>
             </a:fld>
             <a:endParaRPr lang="en-US"/>
           </a:p>
@@ -3889,7 +3888,7 @@
           <a:p>
             <a:fld id="{A8B89F18-586E-4B97-8EEA-25E99A190A89}" type="datetimeFigureOut">
               <a:rPr lang="en-US" smtClean="0"/>
-              <a:t>9/18/2019</a:t>
+              <a:t>9/20/2019</a:t>
             </a:fld>
             <a:endParaRPr lang="en-US"/>
           </a:p>
@@ -4224,7 +4223,7 @@
           <a:p>
             <a:fld id="{A8B89F18-586E-4B97-8EEA-25E99A190A89}" type="datetimeFigureOut">
               <a:rPr lang="en-US" smtClean="0"/>
-              <a:t>9/18/2019</a:t>
+              <a:t>9/20/2019</a:t>
             </a:fld>
             <a:endParaRPr lang="en-US"/>
           </a:p>
@@ -4531,7 +4530,7 @@
           <a:p>
             <a:fld id="{A8B89F18-586E-4B97-8EEA-25E99A190A89}" type="datetimeFigureOut">
               <a:rPr lang="en-US" smtClean="0"/>
-              <a:t>9/18/2019</a:t>
+              <a:t>9/20/2019</a:t>
             </a:fld>
             <a:endParaRPr lang="en-US"/>
           </a:p>
@@ -5036,7 +5035,7 @@
           <a:p>
             <a:fld id="{A8B89F18-586E-4B97-8EEA-25E99A190A89}" type="datetimeFigureOut">
               <a:rPr lang="en-US" smtClean="0"/>
-              <a:t>9/18/2019</a:t>
+              <a:t>9/20/2019</a:t>
             </a:fld>
             <a:endParaRPr lang="en-US"/>
           </a:p>
@@ -5521,7 +5520,7 @@
           <a:p>
             <a:fld id="{A8B89F18-586E-4B97-8EEA-25E99A190A89}" type="datetimeFigureOut">
               <a:rPr lang="en-US" smtClean="0"/>
-              <a:t>9/18/2019</a:t>
+              <a:t>9/20/2019</a:t>
             </a:fld>
             <a:endParaRPr lang="en-US"/>
           </a:p>
@@ -5956,7 +5955,7 @@
           <a:p>
             <a:fld id="{A8B89F18-586E-4B97-8EEA-25E99A190A89}" type="datetimeFigureOut">
               <a:rPr lang="en-US" smtClean="0"/>
-              <a:t>9/18/2019</a:t>
+              <a:t>9/20/2019</a:t>
             </a:fld>
             <a:endParaRPr lang="en-US"/>
           </a:p>
@@ -6629,230 +6628,6 @@
 </p:sld>
 </file>
 
-<file path=ppt/slides/slide10.xml><?xml version="1.0" encoding="utf-8"?>
-<p:sld xmlns:a="http://schemas.openxmlformats.org/drawingml/2006/main" xmlns:r="http://schemas.openxmlformats.org/officeDocument/2006/relationships" xmlns:p="http://schemas.openxmlformats.org/presentationml/2006/main">
-  <p:cSld>
-    <p:spTree>
-      <p:nvGrpSpPr>
-        <p:cNvPr id="1" name=""/>
-        <p:cNvGrpSpPr/>
-        <p:nvPr/>
-      </p:nvGrpSpPr>
-      <p:grpSpPr>
-        <a:xfrm>
-          <a:off x="0" y="0"/>
-          <a:ext cx="0" cy="0"/>
-          <a:chOff x="0" y="0"/>
-          <a:chExt cx="0" cy="0"/>
-        </a:xfrm>
-      </p:grpSpPr>
-      <p:grpSp>
-        <p:nvGrpSpPr>
-          <p:cNvPr id="2" name="Group 1">
-            <a:extLst>
-              <a:ext uri="{FF2B5EF4-FFF2-40B4-BE49-F238E27FC236}">
-                <a16:creationId xmlns:a16="http://schemas.microsoft.com/office/drawing/2014/main" id="{AC447038-DA2B-4C15-A2B1-1E857D7FE9E7}"/>
-              </a:ext>
-            </a:extLst>
-          </p:cNvPr>
-          <p:cNvGrpSpPr/>
-          <p:nvPr/>
-        </p:nvGrpSpPr>
-        <p:grpSpPr>
-          <a:xfrm>
-            <a:off x="0" y="5776566"/>
-            <a:ext cx="12192001" cy="1081434"/>
-            <a:chOff x="0" y="5776566"/>
-            <a:chExt cx="12192001" cy="1081434"/>
-          </a:xfrm>
-        </p:grpSpPr>
-        <p:sp>
-          <p:nvSpPr>
-            <p:cNvPr id="3" name="Rectangle 2">
-              <a:extLst>
-                <a:ext uri="{FF2B5EF4-FFF2-40B4-BE49-F238E27FC236}">
-                  <a16:creationId xmlns:a16="http://schemas.microsoft.com/office/drawing/2014/main" id="{C459A57F-1F79-4689-BAA7-3AECC5DE0406}"/>
-                </a:ext>
-              </a:extLst>
-            </p:cNvPr>
-            <p:cNvSpPr/>
-            <p:nvPr/>
-          </p:nvSpPr>
-          <p:spPr>
-            <a:xfrm>
-              <a:off x="0" y="6098596"/>
-              <a:ext cx="12192001" cy="759404"/>
-            </a:xfrm>
-            <a:prstGeom prst="rect">
-              <a:avLst/>
-            </a:prstGeom>
-            <a:gradFill flip="none" rotWithShape="1">
-              <a:gsLst>
-                <a:gs pos="0">
-                  <a:schemeClr val="bg1"/>
-                </a:gs>
-                <a:gs pos="0">
-                  <a:srgbClr val="0070C0"/>
-                </a:gs>
-                <a:gs pos="90000">
-                  <a:schemeClr val="bg1"/>
-                </a:gs>
-              </a:gsLst>
-              <a:path path="circle">
-                <a:fillToRect l="100000" t="100000"/>
-              </a:path>
-              <a:tileRect r="-100000" b="-100000"/>
-            </a:gradFill>
-            <a:ln>
-              <a:noFill/>
-            </a:ln>
-          </p:spPr>
-          <p:style>
-            <a:lnRef idx="2">
-              <a:schemeClr val="accent1">
-                <a:shade val="50000"/>
-              </a:schemeClr>
-            </a:lnRef>
-            <a:fillRef idx="1">
-              <a:schemeClr val="accent1"/>
-            </a:fillRef>
-            <a:effectRef idx="0">
-              <a:schemeClr val="accent1"/>
-            </a:effectRef>
-            <a:fontRef idx="minor">
-              <a:schemeClr val="lt1"/>
-            </a:fontRef>
-          </p:style>
-          <p:txBody>
-            <a:bodyPr rtlCol="0" anchor="ctr"/>
-            <a:lstStyle/>
-            <a:p>
-              <a:pPr algn="ctr"/>
-              <a:endParaRPr lang="en-US"/>
-            </a:p>
-          </p:txBody>
-        </p:sp>
-        <p:grpSp>
-          <p:nvGrpSpPr>
-            <p:cNvPr id="4" name="Group 3">
-              <a:extLst>
-                <a:ext uri="{FF2B5EF4-FFF2-40B4-BE49-F238E27FC236}">
-                  <a16:creationId xmlns:a16="http://schemas.microsoft.com/office/drawing/2014/main" id="{30A206EC-BAD9-461C-80CF-C7CBE535263B}"/>
-                </a:ext>
-              </a:extLst>
-            </p:cNvPr>
-            <p:cNvGrpSpPr/>
-            <p:nvPr/>
-          </p:nvGrpSpPr>
-          <p:grpSpPr>
-            <a:xfrm>
-              <a:off x="136116" y="5776566"/>
-              <a:ext cx="1766413" cy="974090"/>
-              <a:chOff x="705301" y="2052365"/>
-              <a:chExt cx="5603844" cy="3090246"/>
-            </a:xfrm>
-          </p:grpSpPr>
-          <p:pic>
-            <p:nvPicPr>
-              <p:cNvPr id="5" name="Picture 4">
-                <a:extLst>
-                  <a:ext uri="{FF2B5EF4-FFF2-40B4-BE49-F238E27FC236}">
-                    <a16:creationId xmlns:a16="http://schemas.microsoft.com/office/drawing/2014/main" id="{179E48C2-A268-41DE-AA38-79B36A6DACEE}"/>
-                  </a:ext>
-                </a:extLst>
-              </p:cNvPr>
-              <p:cNvPicPr>
-                <a:picLocks noChangeAspect="1"/>
-              </p:cNvPicPr>
-              <p:nvPr/>
-            </p:nvPicPr>
-            <p:blipFill>
-              <a:blip r:embed="rId2">
-                <a:extLst>
-                  <a:ext uri="{28A0092B-C50C-407E-A947-70E740481C1C}">
-                    <a14:useLocalDpi xmlns:a14="http://schemas.microsoft.com/office/drawing/2010/main" val="0"/>
-                  </a:ext>
-                </a:extLst>
-              </a:blip>
-              <a:stretch>
-                <a:fillRect/>
-              </a:stretch>
-            </p:blipFill>
-            <p:spPr>
-              <a:xfrm>
-                <a:off x="705301" y="2052365"/>
-                <a:ext cx="5603844" cy="3090246"/>
-              </a:xfrm>
-              <a:prstGeom prst="rect">
-                <a:avLst/>
-              </a:prstGeom>
-              <a:effectLst>
-                <a:outerShdw blurRad="50800" dist="38100" dir="5400000" algn="t" rotWithShape="0">
-                  <a:prstClr val="black">
-                    <a:alpha val="40000"/>
-                  </a:prstClr>
-                </a:outerShdw>
-              </a:effectLst>
-            </p:spPr>
-          </p:pic>
-          <p:pic>
-            <p:nvPicPr>
-              <p:cNvPr id="6" name="Picture 5">
-                <a:extLst>
-                  <a:ext uri="{FF2B5EF4-FFF2-40B4-BE49-F238E27FC236}">
-                    <a16:creationId xmlns:a16="http://schemas.microsoft.com/office/drawing/2014/main" id="{EBE1F437-5C0F-4D7C-8F84-CF664F011C65}"/>
-                  </a:ext>
-                </a:extLst>
-              </p:cNvPr>
-              <p:cNvPicPr>
-                <a:picLocks noChangeAspect="1"/>
-              </p:cNvPicPr>
-              <p:nvPr/>
-            </p:nvPicPr>
-            <p:blipFill>
-              <a:blip r:embed="rId3">
-                <a:extLst>
-                  <a:ext uri="{28A0092B-C50C-407E-A947-70E740481C1C}">
-                    <a14:useLocalDpi xmlns:a14="http://schemas.microsoft.com/office/drawing/2010/main" val="0"/>
-                  </a:ext>
-                </a:extLst>
-              </a:blip>
-              <a:stretch>
-                <a:fillRect/>
-              </a:stretch>
-            </p:blipFill>
-            <p:spPr>
-              <a:xfrm>
-                <a:off x="1264843" y="2298120"/>
-                <a:ext cx="4484760" cy="2473126"/>
-              </a:xfrm>
-              <a:prstGeom prst="rect">
-                <a:avLst/>
-              </a:prstGeom>
-              <a:effectLst>
-                <a:outerShdw blurRad="50800" dist="38100" dir="2700000" algn="tl" rotWithShape="0">
-                  <a:schemeClr val="bg1">
-                    <a:alpha val="40000"/>
-                  </a:schemeClr>
-                </a:outerShdw>
-              </a:effectLst>
-            </p:spPr>
-          </p:pic>
-        </p:grpSp>
-      </p:grpSp>
-    </p:spTree>
-    <p:extLst>
-      <p:ext uri="{BB962C8B-B14F-4D97-AF65-F5344CB8AC3E}">
-        <p14:creationId xmlns:p14="http://schemas.microsoft.com/office/powerpoint/2010/main" val="2878183223"/>
-      </p:ext>
-    </p:extLst>
-  </p:cSld>
-  <p:clrMapOvr>
-    <a:masterClrMapping/>
-  </p:clrMapOvr>
-</p:sld>
-</file>
-
 <file path=ppt/slides/slide2.xml><?xml version="1.0" encoding="utf-8"?>
 <p:sld xmlns:a="http://schemas.openxmlformats.org/drawingml/2006/main" xmlns:r="http://schemas.openxmlformats.org/officeDocument/2006/relationships" xmlns:p="http://schemas.openxmlformats.org/presentationml/2006/main">
   <p:cSld>
@@ -6870,83 +6645,6 @@
           <a:chExt cx="0" cy="0"/>
         </a:xfrm>
       </p:grpSpPr>
-      <p:sp>
-        <p:nvSpPr>
-          <p:cNvPr id="3" name="Title 2">
-            <a:extLst>
-              <a:ext uri="{FF2B5EF4-FFF2-40B4-BE49-F238E27FC236}">
-                <a16:creationId xmlns:a16="http://schemas.microsoft.com/office/drawing/2014/main" id="{F7404CC7-B4E9-4814-845C-ECE4EF3629D8}"/>
-              </a:ext>
-            </a:extLst>
-          </p:cNvPr>
-          <p:cNvSpPr>
-            <a:spLocks noGrp="1"/>
-          </p:cNvSpPr>
-          <p:nvPr>
-            <p:ph type="title"/>
-          </p:nvPr>
-        </p:nvSpPr>
-        <p:spPr/>
-        <p:txBody>
-          <a:bodyPr>
-            <a:normAutofit/>
-          </a:bodyPr>
-          <a:lstStyle/>
-          <a:p>
-            <a:pPr algn="ctr"/>
-            <a:r>
-              <a:rPr lang="en-US" sz="5400" dirty="0">
-                <a:latin typeface="Candara" panose="020E0502030303020204" pitchFamily="34" charset="0"/>
-              </a:rPr>
-              <a:t>Sponsors</a:t>
-            </a:r>
-          </a:p>
-        </p:txBody>
-      </p:sp>
-      <p:sp>
-        <p:nvSpPr>
-          <p:cNvPr id="4" name="Content Placeholder 3">
-            <a:extLst>
-              <a:ext uri="{FF2B5EF4-FFF2-40B4-BE49-F238E27FC236}">
-                <a16:creationId xmlns:a16="http://schemas.microsoft.com/office/drawing/2014/main" id="{BC1A9042-1151-4C23-8A0F-8381C4BEF04A}"/>
-              </a:ext>
-            </a:extLst>
-          </p:cNvPr>
-          <p:cNvSpPr>
-            <a:spLocks noGrp="1"/>
-          </p:cNvSpPr>
-          <p:nvPr>
-            <p:ph idx="1"/>
-          </p:nvPr>
-        </p:nvSpPr>
-        <p:spPr>
-          <a:xfrm>
-            <a:off x="838200" y="1825625"/>
-            <a:ext cx="10515600" cy="4149047"/>
-          </a:xfrm>
-        </p:spPr>
-        <p:txBody>
-          <a:bodyPr>
-            <a:normAutofit/>
-          </a:bodyPr>
-          <a:lstStyle/>
-          <a:p>
-            <a:pPr algn="ctr"/>
-            <a:endParaRPr lang="en-US" sz="4400" dirty="0"/>
-          </a:p>
-          <a:p>
-            <a:pPr algn="ctr"/>
-            <a:endParaRPr lang="en-US" sz="4400" dirty="0"/>
-          </a:p>
-          <a:p>
-            <a:pPr algn="ctr"/>
-            <a:r>
-              <a:rPr lang="en-US" sz="4400" dirty="0"/>
-              <a:t>~~ Place Holder ~~</a:t>
-            </a:r>
-          </a:p>
-        </p:txBody>
-      </p:sp>
       <p:grpSp>
         <p:nvGrpSpPr>
           <p:cNvPr id="10" name="Group 9">
@@ -7141,6 +6839,66 @@
           </p:pic>
         </p:grpSp>
       </p:grpSp>
+      <p:pic>
+        <p:nvPicPr>
+          <p:cNvPr id="12" name="Content Placeholder 11" descr="A screenshot of a cell phone&#10;&#10;Description automatically generated">
+            <a:extLst>
+              <a:ext uri="{FF2B5EF4-FFF2-40B4-BE49-F238E27FC236}">
+                <a16:creationId xmlns:a16="http://schemas.microsoft.com/office/drawing/2014/main" id="{B099F1A0-CF36-41F0-B428-E25839CEBFCA}"/>
+              </a:ext>
+            </a:extLst>
+          </p:cNvPr>
+          <p:cNvPicPr>
+            <a:picLocks noGrp="1" noChangeAspect="1"/>
+          </p:cNvPicPr>
+          <p:nvPr>
+            <p:ph idx="1"/>
+          </p:nvPr>
+        </p:nvPicPr>
+        <p:blipFill>
+          <a:blip r:embed="rId4">
+            <a:extLst>
+              <a:ext uri="{28A0092B-C50C-407E-A947-70E740481C1C}">
+                <a14:useLocalDpi xmlns:a14="http://schemas.microsoft.com/office/drawing/2010/main" val="0"/>
+              </a:ext>
+            </a:extLst>
+          </a:blip>
+          <a:stretch>
+            <a:fillRect/>
+          </a:stretch>
+        </p:blipFill>
+        <p:spPr>
+          <a:xfrm>
+            <a:off x="1166092" y="45980"/>
+            <a:ext cx="10187708" cy="5730586"/>
+          </a:xfrm>
+        </p:spPr>
+      </p:pic>
+      <p:sp>
+        <p:nvSpPr>
+          <p:cNvPr id="14" name="Title 13">
+            <a:extLst>
+              <a:ext uri="{FF2B5EF4-FFF2-40B4-BE49-F238E27FC236}">
+                <a16:creationId xmlns:a16="http://schemas.microsoft.com/office/drawing/2014/main" id="{A453B2E6-BC1C-47A8-A041-D5A9F1A856AA}"/>
+              </a:ext>
+            </a:extLst>
+          </p:cNvPr>
+          <p:cNvSpPr>
+            <a:spLocks noGrp="1"/>
+          </p:cNvSpPr>
+          <p:nvPr>
+            <p:ph type="title"/>
+          </p:nvPr>
+        </p:nvSpPr>
+        <p:spPr/>
+        <p:txBody>
+          <a:bodyPr/>
+          <a:lstStyle/>
+          <a:p>
+            <a:endParaRPr lang="en-US" dirty="0"/>
+          </a:p>
+        </p:txBody>
+      </p:sp>
     </p:spTree>
     <p:extLst>
       <p:ext uri="{BB962C8B-B14F-4D97-AF65-F5344CB8AC3E}">
@@ -9225,12 +8983,14 @@
         </p:nvSpPr>
         <p:spPr>
           <a:xfrm>
-            <a:off x="2152650" y="1825625"/>
-            <a:ext cx="4922853" cy="4351338"/>
+            <a:off x="838200" y="1532548"/>
+            <a:ext cx="8386396" cy="4351338"/>
           </a:xfrm>
         </p:spPr>
         <p:txBody>
-          <a:bodyPr/>
+          <a:bodyPr>
+            <a:normAutofit/>
+          </a:bodyPr>
           <a:lstStyle/>
           <a:p>
             <a:pPr marL="362880" indent="-362880"/>
@@ -9294,36 +9054,73 @@
             <a:pPr marL="362880" indent="-362880"/>
             <a:r>
               <a:rPr lang="en-US" dirty="0"/>
-              <a:t>Manning MEAP (Out Now)</a:t>
+              <a:t>“</a:t>
+            </a:r>
+            <a:r>
+              <a:rPr lang="en-US" dirty="0" err="1"/>
+              <a:t>Dbatools</a:t>
+            </a:r>
+            <a:r>
+              <a:rPr lang="en-US" dirty="0"/>
+              <a:t> in a month of lunches”</a:t>
+            </a:r>
+          </a:p>
+          <a:p>
+            <a:pPr marL="820080" lvl="1" indent="-362880"/>
+            <a:r>
+              <a:rPr lang="en-US" dirty="0"/>
+              <a:t>Manning MEAP</a:t>
+            </a:r>
+          </a:p>
+          <a:p>
+            <a:pPr marL="362880" indent="-362880"/>
+            <a:r>
+              <a:rPr lang="en-US" sz="2400"/>
+              <a:t>https</a:t>
+            </a:r>
+            <a:r>
+              <a:rPr lang="en-US" sz="2400" dirty="0"/>
+              <a:t>://github.com/sqlcollaborative/community-presentations</a:t>
             </a:r>
           </a:p>
         </p:txBody>
       </p:sp>
-      <p:sp>
-        <p:nvSpPr>
-          <p:cNvPr id="4" name="Content Placeholder 3">
-            <a:extLst>
-              <a:ext uri="{FF2B5EF4-FFF2-40B4-BE49-F238E27FC236}">
-                <a16:creationId xmlns:a16="http://schemas.microsoft.com/office/drawing/2014/main" id="{1DAB6B01-FCB9-433D-AFAB-534841F4A283}"/>
-              </a:ext>
-            </a:extLst>
-          </p:cNvPr>
-          <p:cNvSpPr>
-            <a:spLocks noGrp="1"/>
-          </p:cNvSpPr>
-          <p:nvPr>
-            <p:ph sz="half" idx="2"/>
-          </p:nvPr>
-        </p:nvSpPr>
-        <p:spPr/>
-        <p:txBody>
-          <a:bodyPr/>
-          <a:lstStyle/>
-          <a:p>
-            <a:endParaRPr lang="en-US"/>
-          </a:p>
-        </p:txBody>
-      </p:sp>
+      <p:pic>
+        <p:nvPicPr>
+          <p:cNvPr id="5" name="Picture 4" descr="A close up of a sign&#10;&#10;Description automatically generated">
+            <a:extLst>
+              <a:ext uri="{FF2B5EF4-FFF2-40B4-BE49-F238E27FC236}">
+                <a16:creationId xmlns:a16="http://schemas.microsoft.com/office/drawing/2014/main" id="{28644433-72A7-4845-9C7A-326015BD1805}"/>
+              </a:ext>
+            </a:extLst>
+          </p:cNvPr>
+          <p:cNvPicPr>
+            <a:picLocks noChangeAspect="1"/>
+          </p:cNvPicPr>
+          <p:nvPr/>
+        </p:nvPicPr>
+        <p:blipFill>
+          <a:blip r:embed="rId3">
+            <a:extLst>
+              <a:ext uri="{28A0092B-C50C-407E-A947-70E740481C1C}">
+                <a14:useLocalDpi xmlns:a14="http://schemas.microsoft.com/office/drawing/2010/main" val="0"/>
+              </a:ext>
+            </a:extLst>
+          </a:blip>
+          <a:stretch>
+            <a:fillRect/>
+          </a:stretch>
+        </p:blipFill>
+        <p:spPr>
+          <a:xfrm>
+            <a:off x="7101702" y="974114"/>
+            <a:ext cx="3311804" cy="4162754"/>
+          </a:xfrm>
+          <a:prstGeom prst="rect">
+            <a:avLst/>
+          </a:prstGeom>
+        </p:spPr>
+      </p:pic>
     </p:spTree>
     <p:extLst>
       <p:ext uri="{BB962C8B-B14F-4D97-AF65-F5344CB8AC3E}">
@@ -9694,6 +9491,173 @@
                                           <p:spTgt spid="3">
                                             <p:txEl>
                                               <p:pRg st="5" end="5"/>
+                                            </p:txEl>
+                                          </p:spTgt>
+                                        </p:tgtEl>
+                                      </p:cBhvr>
+                                    </p:animEffect>
+                                  </p:childTnLst>
+                                </p:cTn>
+                              </p:par>
+                            </p:childTnLst>
+                          </p:cTn>
+                        </p:par>
+                      </p:childTnLst>
+                    </p:cTn>
+                  </p:par>
+                  <p:par>
+                    <p:cTn id="33" fill="hold">
+                      <p:stCondLst>
+                        <p:cond delay="indefinite"/>
+                      </p:stCondLst>
+                      <p:childTnLst>
+                        <p:par>
+                          <p:cTn id="34" fill="hold">
+                            <p:stCondLst>
+                              <p:cond delay="0"/>
+                            </p:stCondLst>
+                            <p:childTnLst>
+                              <p:par>
+                                <p:cTn id="35" presetID="1" presetClass="entr" presetSubtype="0" fill="hold" nodeType="clickEffect">
+                                  <p:stCondLst>
+                                    <p:cond delay="0"/>
+                                  </p:stCondLst>
+                                  <p:childTnLst>
+                                    <p:set>
+                                      <p:cBhvr>
+                                        <p:cTn id="36" dur="1" fill="hold">
+                                          <p:stCondLst>
+                                            <p:cond delay="0"/>
+                                          </p:stCondLst>
+                                        </p:cTn>
+                                        <p:tgtEl>
+                                          <p:spTgt spid="5"/>
+                                        </p:tgtEl>
+                                        <p:attrNameLst>
+                                          <p:attrName>style.visibility</p:attrName>
+                                        </p:attrNameLst>
+                                      </p:cBhvr>
+                                      <p:to>
+                                        <p:strVal val="visible"/>
+                                      </p:to>
+                                    </p:set>
+                                  </p:childTnLst>
+                                </p:cTn>
+                              </p:par>
+                            </p:childTnLst>
+                          </p:cTn>
+                        </p:par>
+                      </p:childTnLst>
+                    </p:cTn>
+                  </p:par>
+                  <p:par>
+                    <p:cTn id="37" fill="hold">
+                      <p:stCondLst>
+                        <p:cond delay="indefinite"/>
+                      </p:stCondLst>
+                      <p:childTnLst>
+                        <p:par>
+                          <p:cTn id="38" fill="hold">
+                            <p:stCondLst>
+                              <p:cond delay="0"/>
+                            </p:stCondLst>
+                            <p:childTnLst>
+                              <p:par>
+                                <p:cTn id="39" presetID="10" presetClass="entr" presetSubtype="0" fill="hold" nodeType="clickEffect">
+                                  <p:stCondLst>
+                                    <p:cond delay="0"/>
+                                  </p:stCondLst>
+                                  <p:childTnLst>
+                                    <p:set>
+                                      <p:cBhvr>
+                                        <p:cTn id="40" dur="1" fill="hold">
+                                          <p:stCondLst>
+                                            <p:cond delay="0"/>
+                                          </p:stCondLst>
+                                        </p:cTn>
+                                        <p:tgtEl>
+                                          <p:spTgt spid="3">
+                                            <p:txEl>
+                                              <p:pRg st="6" end="6"/>
+                                            </p:txEl>
+                                          </p:spTgt>
+                                        </p:tgtEl>
+                                        <p:attrNameLst>
+                                          <p:attrName>style.visibility</p:attrName>
+                                        </p:attrNameLst>
+                                      </p:cBhvr>
+                                      <p:to>
+                                        <p:strVal val="visible"/>
+                                      </p:to>
+                                    </p:set>
+                                    <p:animEffect transition="in" filter="fade">
+                                      <p:cBhvr>
+                                        <p:cTn id="41" dur="500"/>
+                                        <p:tgtEl>
+                                          <p:spTgt spid="3">
+                                            <p:txEl>
+                                              <p:pRg st="6" end="6"/>
+                                            </p:txEl>
+                                          </p:spTgt>
+                                        </p:tgtEl>
+                                      </p:cBhvr>
+                                    </p:animEffect>
+                                  </p:childTnLst>
+                                </p:cTn>
+                              </p:par>
+                            </p:childTnLst>
+                          </p:cTn>
+                        </p:par>
+                      </p:childTnLst>
+                    </p:cTn>
+                  </p:par>
+                  <p:par>
+                    <p:cTn id="42" fill="hold">
+                      <p:stCondLst>
+                        <p:cond delay="indefinite"/>
+                      </p:stCondLst>
+                      <p:childTnLst>
+                        <p:par>
+                          <p:cTn id="43" fill="hold">
+                            <p:stCondLst>
+                              <p:cond delay="0"/>
+                            </p:stCondLst>
+                            <p:childTnLst>
+                              <p:par>
+                                <p:cTn id="44" presetID="10" presetClass="entr" presetSubtype="0" fill="hold" nodeType="clickEffect">
+                                  <p:stCondLst>
+                                    <p:cond delay="0"/>
+                                  </p:stCondLst>
+                                  <p:childTnLst>
+                                    <p:set>
+                                      <p:cBhvr>
+                                        <p:cTn id="45" dur="1" fill="hold">
+                                          <p:stCondLst>
+                                            <p:cond delay="0"/>
+                                          </p:stCondLst>
+                                        </p:cTn>
+                                        <p:tgtEl>
+                                          <p:spTgt spid="3">
+                                            <p:txEl>
+                                              <p:pRg st="7" end="7"/>
+                                            </p:txEl>
+                                          </p:spTgt>
+                                        </p:tgtEl>
+                                        <p:attrNameLst>
+                                          <p:attrName>style.visibility</p:attrName>
+                                        </p:attrNameLst>
+                                      </p:cBhvr>
+                                      <p:to>
+                                        <p:strVal val="visible"/>
+                                      </p:to>
+                                    </p:set>
+                                    <p:animEffect transition="in" filter="fade">
+                                      <p:cBhvr>
+                                        <p:cTn id="46" dur="500"/>
+                                        <p:tgtEl>
+                                          <p:spTgt spid="3">
+                                            <p:txEl>
+                                              <p:pRg st="7" end="7"/>
                                             </p:txEl>
                                           </p:spTgt>
                                         </p:tgtEl>

</xml_diff>